<commit_message>
Removed redundant classes and added member/class/instructor count on main page
</commit_message>
<xml_diff>
--- a/gym_project.pptx
+++ b/gym_project.pptx
@@ -5,7 +5,7 @@
     <p:sldMasterId id="2147483659" r:id="rId1"/>
   </p:sldMasterIdLst>
   <p:notesMasterIdLst>
-    <p:notesMasterId r:id="rId14"/>
+    <p:notesMasterId r:id="rId16"/>
   </p:notesMasterIdLst>
   <p:sldIdLst>
     <p:sldId id="264" r:id="rId2"/>
@@ -20,6 +20,8 @@
     <p:sldId id="266" r:id="rId11"/>
     <p:sldId id="267" r:id="rId12"/>
     <p:sldId id="268" r:id="rId13"/>
+    <p:sldId id="269" r:id="rId14"/>
+    <p:sldId id="270" r:id="rId15"/>
   </p:sldIdLst>
   <p:sldSz cx="9144000" cy="6858000" type="screen4x3"/>
   <p:notesSz cx="6858000" cy="9144000"/>
@@ -5807,6 +5809,495 @@
 </p:sld>
 </file>
 
+<file path=ppt/slides/slide13.xml><?xml version="1.0" encoding="utf-8"?>
+<p:sld xmlns:a="http://schemas.openxmlformats.org/drawingml/2006/main" xmlns:r="http://schemas.openxmlformats.org/officeDocument/2006/relationships" xmlns:p="http://schemas.openxmlformats.org/presentationml/2006/main">
+  <p:cSld>
+    <p:spTree>
+      <p:nvGrpSpPr>
+        <p:cNvPr id="1" name=""/>
+        <p:cNvGrpSpPr/>
+        <p:nvPr/>
+      </p:nvGrpSpPr>
+      <p:grpSpPr>
+        <a:xfrm>
+          <a:off x="0" y="0"/>
+          <a:ext cx="0" cy="0"/>
+          <a:chOff x="0" y="0"/>
+          <a:chExt cx="0" cy="0"/>
+        </a:xfrm>
+      </p:grpSpPr>
+      <p:sp>
+        <p:nvSpPr>
+          <p:cNvPr id="2" name="Title 1"/>
+          <p:cNvSpPr>
+            <a:spLocks noGrp="1"/>
+          </p:cNvSpPr>
+          <p:nvPr>
+            <p:ph type="title"/>
+          </p:nvPr>
+        </p:nvSpPr>
+        <p:spPr>
+          <a:xfrm>
+            <a:off x="2783" y="282806"/>
+            <a:ext cx="5310627" cy="886119"/>
+          </a:xfrm>
+        </p:spPr>
+        <p:txBody>
+          <a:bodyPr/>
+          <a:lstStyle/>
+          <a:p>
+            <a:r>
+              <a:rPr lang="en-GB" sz="2800" dirty="0" smtClean="0">
+                <a:solidFill>
+                  <a:schemeClr val="tx1">
+                    <a:lumMod val="50000"/>
+                    <a:lumOff val="50000"/>
+                  </a:schemeClr>
+                </a:solidFill>
+              </a:rPr>
+              <a:t>Regrets</a:t>
+            </a:r>
+            <a:r>
+              <a:rPr lang="mr-IN" sz="2800" dirty="0" smtClean="0">
+                <a:solidFill>
+                  <a:schemeClr val="tx1">
+                    <a:lumMod val="50000"/>
+                    <a:lumOff val="50000"/>
+                  </a:schemeClr>
+                </a:solidFill>
+              </a:rPr>
+              <a:t>…</a:t>
+            </a:r>
+            <a:endParaRPr lang="en-GB" sz="2800" dirty="0">
+              <a:solidFill>
+                <a:schemeClr val="tx1">
+                  <a:lumMod val="50000"/>
+                  <a:lumOff val="50000"/>
+                </a:schemeClr>
+              </a:solidFill>
+            </a:endParaRPr>
+          </a:p>
+        </p:txBody>
+      </p:sp>
+      <p:sp>
+        <p:nvSpPr>
+          <p:cNvPr id="4" name="Title 1"/>
+          <p:cNvSpPr txBox="1">
+            <a:spLocks/>
+          </p:cNvSpPr>
+          <p:nvPr/>
+        </p:nvSpPr>
+        <p:spPr>
+          <a:xfrm>
+            <a:off x="3756460" y="5143144"/>
+            <a:ext cx="5376524" cy="886119"/>
+          </a:xfrm>
+          <a:prstGeom prst="rect">
+            <a:avLst/>
+          </a:prstGeom>
+          <a:noFill/>
+          <a:ln>
+            <a:noFill/>
+          </a:ln>
+        </p:spPr>
+        <p:txBody>
+          <a:bodyPr spcFirstLastPara="1" wrap="square" lIns="91425" tIns="91425" rIns="91425" bIns="91425" anchor="ctr" anchorCtr="0"/>
+          <a:lstStyle>
+            <a:defPPr marR="0" lvl="0" algn="l" rtl="0">
+              <a:lnSpc>
+                <a:spcPct val="100000"/>
+              </a:lnSpc>
+              <a:spcBef>
+                <a:spcPts val="0"/>
+              </a:spcBef>
+              <a:spcAft>
+                <a:spcPts val="0"/>
+              </a:spcAft>
+            </a:defPPr>
+            <a:lvl1pPr marR="0" lvl="0" algn="ctr" rtl="0">
+              <a:lnSpc>
+                <a:spcPct val="100000"/>
+              </a:lnSpc>
+              <a:spcBef>
+                <a:spcPts val="0"/>
+              </a:spcBef>
+              <a:spcAft>
+                <a:spcPts val="0"/>
+              </a:spcAft>
+              <a:buClr>
+                <a:schemeClr val="dk1"/>
+              </a:buClr>
+              <a:buSzPts val="3600"/>
+              <a:buFont typeface="Arial"/>
+              <a:buNone/>
+              <a:defRPr sz="3600" b="0" i="0" u="none" strike="noStrike" cap="none">
+                <a:solidFill>
+                  <a:schemeClr val="dk1"/>
+                </a:solidFill>
+                <a:latin typeface="Arial"/>
+                <a:ea typeface="Arial"/>
+                <a:cs typeface="Arial"/>
+                <a:sym typeface="Arial"/>
+              </a:defRPr>
+            </a:lvl1pPr>
+            <a:lvl2pPr marR="0" lvl="1" algn="ctr" rtl="0">
+              <a:lnSpc>
+                <a:spcPct val="100000"/>
+              </a:lnSpc>
+              <a:spcBef>
+                <a:spcPts val="0"/>
+              </a:spcBef>
+              <a:spcAft>
+                <a:spcPts val="0"/>
+              </a:spcAft>
+              <a:buClr>
+                <a:schemeClr val="dk1"/>
+              </a:buClr>
+              <a:buSzPts val="3600"/>
+              <a:buFont typeface="Arial"/>
+              <a:buNone/>
+              <a:defRPr sz="3600" b="0" i="0" u="none" strike="noStrike" cap="none">
+                <a:solidFill>
+                  <a:schemeClr val="dk1"/>
+                </a:solidFill>
+                <a:latin typeface="Arial"/>
+                <a:ea typeface="Arial"/>
+                <a:cs typeface="Arial"/>
+                <a:sym typeface="Arial"/>
+              </a:defRPr>
+            </a:lvl2pPr>
+            <a:lvl3pPr marR="0" lvl="2" algn="ctr" rtl="0">
+              <a:lnSpc>
+                <a:spcPct val="100000"/>
+              </a:lnSpc>
+              <a:spcBef>
+                <a:spcPts val="0"/>
+              </a:spcBef>
+              <a:spcAft>
+                <a:spcPts val="0"/>
+              </a:spcAft>
+              <a:buClr>
+                <a:schemeClr val="dk1"/>
+              </a:buClr>
+              <a:buSzPts val="3600"/>
+              <a:buFont typeface="Arial"/>
+              <a:buNone/>
+              <a:defRPr sz="3600" b="0" i="0" u="none" strike="noStrike" cap="none">
+                <a:solidFill>
+                  <a:schemeClr val="dk1"/>
+                </a:solidFill>
+                <a:latin typeface="Arial"/>
+                <a:ea typeface="Arial"/>
+                <a:cs typeface="Arial"/>
+                <a:sym typeface="Arial"/>
+              </a:defRPr>
+            </a:lvl3pPr>
+            <a:lvl4pPr marR="0" lvl="3" algn="ctr" rtl="0">
+              <a:lnSpc>
+                <a:spcPct val="100000"/>
+              </a:lnSpc>
+              <a:spcBef>
+                <a:spcPts val="0"/>
+              </a:spcBef>
+              <a:spcAft>
+                <a:spcPts val="0"/>
+              </a:spcAft>
+              <a:buClr>
+                <a:schemeClr val="dk1"/>
+              </a:buClr>
+              <a:buSzPts val="3600"/>
+              <a:buFont typeface="Arial"/>
+              <a:buNone/>
+              <a:defRPr sz="3600" b="0" i="0" u="none" strike="noStrike" cap="none">
+                <a:solidFill>
+                  <a:schemeClr val="dk1"/>
+                </a:solidFill>
+                <a:latin typeface="Arial"/>
+                <a:ea typeface="Arial"/>
+                <a:cs typeface="Arial"/>
+                <a:sym typeface="Arial"/>
+              </a:defRPr>
+            </a:lvl4pPr>
+            <a:lvl5pPr marR="0" lvl="4" algn="ctr" rtl="0">
+              <a:lnSpc>
+                <a:spcPct val="100000"/>
+              </a:lnSpc>
+              <a:spcBef>
+                <a:spcPts val="0"/>
+              </a:spcBef>
+              <a:spcAft>
+                <a:spcPts val="0"/>
+              </a:spcAft>
+              <a:buClr>
+                <a:schemeClr val="dk1"/>
+              </a:buClr>
+              <a:buSzPts val="3600"/>
+              <a:buFont typeface="Arial"/>
+              <a:buNone/>
+              <a:defRPr sz="3600" b="0" i="0" u="none" strike="noStrike" cap="none">
+                <a:solidFill>
+                  <a:schemeClr val="dk1"/>
+                </a:solidFill>
+                <a:latin typeface="Arial"/>
+                <a:ea typeface="Arial"/>
+                <a:cs typeface="Arial"/>
+                <a:sym typeface="Arial"/>
+              </a:defRPr>
+            </a:lvl5pPr>
+            <a:lvl6pPr marR="0" lvl="5" algn="ctr" rtl="0">
+              <a:lnSpc>
+                <a:spcPct val="100000"/>
+              </a:lnSpc>
+              <a:spcBef>
+                <a:spcPts val="0"/>
+              </a:spcBef>
+              <a:spcAft>
+                <a:spcPts val="0"/>
+              </a:spcAft>
+              <a:buClr>
+                <a:schemeClr val="dk1"/>
+              </a:buClr>
+              <a:buSzPts val="3600"/>
+              <a:buFont typeface="Arial"/>
+              <a:buNone/>
+              <a:defRPr sz="3600" b="0" i="0" u="none" strike="noStrike" cap="none">
+                <a:solidFill>
+                  <a:schemeClr val="dk1"/>
+                </a:solidFill>
+                <a:latin typeface="Arial"/>
+                <a:ea typeface="Arial"/>
+                <a:cs typeface="Arial"/>
+                <a:sym typeface="Arial"/>
+              </a:defRPr>
+            </a:lvl6pPr>
+            <a:lvl7pPr marR="0" lvl="6" algn="ctr" rtl="0">
+              <a:lnSpc>
+                <a:spcPct val="100000"/>
+              </a:lnSpc>
+              <a:spcBef>
+                <a:spcPts val="0"/>
+              </a:spcBef>
+              <a:spcAft>
+                <a:spcPts val="0"/>
+              </a:spcAft>
+              <a:buClr>
+                <a:schemeClr val="dk1"/>
+              </a:buClr>
+              <a:buSzPts val="3600"/>
+              <a:buFont typeface="Arial"/>
+              <a:buNone/>
+              <a:defRPr sz="3600" b="0" i="0" u="none" strike="noStrike" cap="none">
+                <a:solidFill>
+                  <a:schemeClr val="dk1"/>
+                </a:solidFill>
+                <a:latin typeface="Arial"/>
+                <a:ea typeface="Arial"/>
+                <a:cs typeface="Arial"/>
+                <a:sym typeface="Arial"/>
+              </a:defRPr>
+            </a:lvl7pPr>
+            <a:lvl8pPr marR="0" lvl="7" algn="ctr" rtl="0">
+              <a:lnSpc>
+                <a:spcPct val="100000"/>
+              </a:lnSpc>
+              <a:spcBef>
+                <a:spcPts val="0"/>
+              </a:spcBef>
+              <a:spcAft>
+                <a:spcPts val="0"/>
+              </a:spcAft>
+              <a:buClr>
+                <a:schemeClr val="dk1"/>
+              </a:buClr>
+              <a:buSzPts val="3600"/>
+              <a:buFont typeface="Arial"/>
+              <a:buNone/>
+              <a:defRPr sz="3600" b="0" i="0" u="none" strike="noStrike" cap="none">
+                <a:solidFill>
+                  <a:schemeClr val="dk1"/>
+                </a:solidFill>
+                <a:latin typeface="Arial"/>
+                <a:ea typeface="Arial"/>
+                <a:cs typeface="Arial"/>
+                <a:sym typeface="Arial"/>
+              </a:defRPr>
+            </a:lvl8pPr>
+            <a:lvl9pPr marR="0" lvl="8" algn="ctr" rtl="0">
+              <a:lnSpc>
+                <a:spcPct val="100000"/>
+              </a:lnSpc>
+              <a:spcBef>
+                <a:spcPts val="0"/>
+              </a:spcBef>
+              <a:spcAft>
+                <a:spcPts val="0"/>
+              </a:spcAft>
+              <a:buClr>
+                <a:schemeClr val="dk1"/>
+              </a:buClr>
+              <a:buSzPts val="3600"/>
+              <a:buFont typeface="Arial"/>
+              <a:buNone/>
+              <a:defRPr sz="3600" b="0" i="0" u="none" strike="noStrike" cap="none">
+                <a:solidFill>
+                  <a:schemeClr val="dk1"/>
+                </a:solidFill>
+                <a:latin typeface="Arial"/>
+                <a:ea typeface="Arial"/>
+                <a:cs typeface="Arial"/>
+                <a:sym typeface="Arial"/>
+              </a:defRPr>
+            </a:lvl9pPr>
+          </a:lstStyle>
+          <a:p>
+            <a:r>
+              <a:rPr lang="mr-IN" sz="2800" dirty="0" smtClean="0">
+                <a:solidFill>
+                  <a:schemeClr val="tx1">
+                    <a:lumMod val="50000"/>
+                    <a:lumOff val="50000"/>
+                  </a:schemeClr>
+                </a:solidFill>
+              </a:rPr>
+              <a:t>…</a:t>
+            </a:r>
+            <a:r>
+              <a:rPr lang="en-US" sz="2800" dirty="0" smtClean="0">
+                <a:solidFill>
+                  <a:schemeClr val="tx1">
+                    <a:lumMod val="50000"/>
+                    <a:lumOff val="50000"/>
+                  </a:schemeClr>
+                </a:solidFill>
+              </a:rPr>
+              <a:t>I’ve had a few.</a:t>
+            </a:r>
+            <a:endParaRPr lang="en-GB" sz="2800" dirty="0">
+              <a:solidFill>
+                <a:schemeClr val="tx1">
+                  <a:lumMod val="50000"/>
+                  <a:lumOff val="50000"/>
+                </a:schemeClr>
+              </a:solidFill>
+            </a:endParaRPr>
+          </a:p>
+        </p:txBody>
+      </p:sp>
+      <p:pic>
+        <p:nvPicPr>
+          <p:cNvPr id="3" name="Picture 2"/>
+          <p:cNvPicPr>
+            <a:picLocks noChangeAspect="1"/>
+          </p:cNvPicPr>
+          <p:nvPr/>
+        </p:nvPicPr>
+        <p:blipFill>
+          <a:blip r:embed="rId2">
+            <a:extLst>
+              <a:ext uri="{28A0092B-C50C-407E-A947-70E740481C1C}">
+                <a14:useLocalDpi xmlns:a14="http://schemas.microsoft.com/office/drawing/2010/main" val="0"/>
+              </a:ext>
+            </a:extLst>
+          </a:blip>
+          <a:stretch>
+            <a:fillRect/>
+          </a:stretch>
+        </p:blipFill>
+        <p:spPr>
+          <a:xfrm>
+            <a:off x="2705100" y="1189679"/>
+            <a:ext cx="3721100" cy="3860800"/>
+          </a:xfrm>
+          <a:prstGeom prst="rect">
+            <a:avLst/>
+          </a:prstGeom>
+        </p:spPr>
+      </p:pic>
+    </p:spTree>
+    <p:extLst>
+      <p:ext uri="{BB962C8B-B14F-4D97-AF65-F5344CB8AC3E}">
+        <p14:creationId xmlns:p14="http://schemas.microsoft.com/office/powerpoint/2010/main" val="76196489"/>
+      </p:ext>
+    </p:extLst>
+  </p:cSld>
+  <p:clrMapOvr>
+    <a:masterClrMapping/>
+  </p:clrMapOvr>
+  <p:timing>
+    <p:tnLst>
+      <p:par>
+        <p:cTn id="1" dur="indefinite" restart="never" nodeType="tmRoot"/>
+      </p:par>
+    </p:tnLst>
+  </p:timing>
+</p:sld>
+</file>
+
+<file path=ppt/slides/slide14.xml><?xml version="1.0" encoding="utf-8"?>
+<p:sld xmlns:a="http://schemas.openxmlformats.org/drawingml/2006/main" xmlns:r="http://schemas.openxmlformats.org/officeDocument/2006/relationships" xmlns:p="http://schemas.openxmlformats.org/presentationml/2006/main">
+  <p:cSld>
+    <p:spTree>
+      <p:nvGrpSpPr>
+        <p:cNvPr id="1" name=""/>
+        <p:cNvGrpSpPr/>
+        <p:nvPr/>
+      </p:nvGrpSpPr>
+      <p:grpSpPr>
+        <a:xfrm>
+          <a:off x="0" y="0"/>
+          <a:ext cx="0" cy="0"/>
+          <a:chOff x="0" y="0"/>
+          <a:chExt cx="0" cy="0"/>
+        </a:xfrm>
+      </p:grpSpPr>
+      <p:sp>
+        <p:nvSpPr>
+          <p:cNvPr id="2" name="Title 1"/>
+          <p:cNvSpPr>
+            <a:spLocks noGrp="1"/>
+          </p:cNvSpPr>
+          <p:nvPr>
+            <p:ph type="title"/>
+          </p:nvPr>
+        </p:nvSpPr>
+        <p:spPr>
+          <a:xfrm>
+            <a:off x="311700" y="2457604"/>
+            <a:ext cx="8520600" cy="886119"/>
+          </a:xfrm>
+        </p:spPr>
+        <p:txBody>
+          <a:bodyPr/>
+          <a:lstStyle/>
+          <a:p>
+            <a:r>
+              <a:rPr lang="en-GB" dirty="0" smtClean="0"/>
+              <a:t>Questions?</a:t>
+            </a:r>
+            <a:endParaRPr lang="en-GB" dirty="0"/>
+          </a:p>
+        </p:txBody>
+      </p:sp>
+    </p:spTree>
+    <p:extLst>
+      <p:ext uri="{BB962C8B-B14F-4D97-AF65-F5344CB8AC3E}">
+        <p14:creationId xmlns:p14="http://schemas.microsoft.com/office/powerpoint/2010/main" val="1058052931"/>
+      </p:ext>
+    </p:extLst>
+  </p:cSld>
+  <p:clrMapOvr>
+    <a:masterClrMapping/>
+  </p:clrMapOvr>
+  <p:timing>
+    <p:tnLst>
+      <p:par>
+        <p:cTn id="1" dur="indefinite" restart="never" nodeType="tmRoot"/>
+      </p:par>
+    </p:tnLst>
+  </p:timing>
+</p:sld>
+</file>
+
 <file path=ppt/slides/slide2.xml><?xml version="1.0" encoding="utf-8"?>
 <p:sld xmlns:a="http://schemas.openxmlformats.org/drawingml/2006/main" xmlns:r="http://schemas.openxmlformats.org/officeDocument/2006/relationships" xmlns:p="http://schemas.openxmlformats.org/presentationml/2006/main">
   <p:cSld>

</xml_diff>

<commit_message>
Fixed capacity check bug
</commit_message>
<xml_diff>
--- a/gym_project.pptx
+++ b/gym_project.pptx
@@ -5,7 +5,7 @@
     <p:sldMasterId id="2147483659" r:id="rId1"/>
   </p:sldMasterIdLst>
   <p:notesMasterIdLst>
-    <p:notesMasterId r:id="rId16"/>
+    <p:notesMasterId r:id="rId17"/>
   </p:notesMasterIdLst>
   <p:sldIdLst>
     <p:sldId id="264" r:id="rId2"/>
@@ -20,8 +20,9 @@
     <p:sldId id="266" r:id="rId11"/>
     <p:sldId id="267" r:id="rId12"/>
     <p:sldId id="268" r:id="rId13"/>
-    <p:sldId id="269" r:id="rId14"/>
-    <p:sldId id="270" r:id="rId15"/>
+    <p:sldId id="271" r:id="rId14"/>
+    <p:sldId id="269" r:id="rId15"/>
+    <p:sldId id="270" r:id="rId16"/>
   </p:sldIdLst>
   <p:sldSz cx="9144000" cy="6858000" type="screen4x3"/>
   <p:notesSz cx="6858000" cy="9144000"/>
@@ -5794,6 +5795,36 @@
           </a:p>
         </p:txBody>
       </p:sp>
+      <p:pic>
+        <p:nvPicPr>
+          <p:cNvPr id="3" name="Picture 2"/>
+          <p:cNvPicPr>
+            <a:picLocks noChangeAspect="1"/>
+          </p:cNvPicPr>
+          <p:nvPr/>
+        </p:nvPicPr>
+        <p:blipFill>
+          <a:blip r:embed="rId2">
+            <a:extLst>
+              <a:ext uri="{28A0092B-C50C-407E-A947-70E740481C1C}">
+                <a14:useLocalDpi xmlns:a14="http://schemas.microsoft.com/office/drawing/2010/main" val="0"/>
+              </a:ext>
+            </a:extLst>
+          </a:blip>
+          <a:stretch>
+            <a:fillRect/>
+          </a:stretch>
+        </p:blipFill>
+        <p:spPr>
+          <a:xfrm>
+            <a:off x="2136346" y="1577603"/>
+            <a:ext cx="4871308" cy="4730519"/>
+          </a:xfrm>
+          <a:prstGeom prst="rect">
+            <a:avLst/>
+          </a:prstGeom>
+        </p:spPr>
+      </p:pic>
     </p:spTree>
   </p:cSld>
   <p:clrMapOvr>
@@ -5810,6 +5841,43 @@
 </file>
 
 <file path=ppt/slides/slide13.xml><?xml version="1.0" encoding="utf-8"?>
+<p:sld xmlns:a="http://schemas.openxmlformats.org/drawingml/2006/main" xmlns:r="http://schemas.openxmlformats.org/officeDocument/2006/relationships" xmlns:p="http://schemas.openxmlformats.org/presentationml/2006/main">
+  <p:cSld>
+    <p:spTree>
+      <p:nvGrpSpPr>
+        <p:cNvPr id="1" name=""/>
+        <p:cNvGrpSpPr/>
+        <p:nvPr/>
+      </p:nvGrpSpPr>
+      <p:grpSpPr>
+        <a:xfrm>
+          <a:off x="0" y="0"/>
+          <a:ext cx="0" cy="0"/>
+          <a:chOff x="0" y="0"/>
+          <a:chExt cx="0" cy="0"/>
+        </a:xfrm>
+      </p:grpSpPr>
+    </p:spTree>
+    <p:extLst>
+      <p:ext uri="{BB962C8B-B14F-4D97-AF65-F5344CB8AC3E}">
+        <p14:creationId xmlns:p14="http://schemas.microsoft.com/office/powerpoint/2010/main" val="638226437"/>
+      </p:ext>
+    </p:extLst>
+  </p:cSld>
+  <p:clrMapOvr>
+    <a:masterClrMapping/>
+  </p:clrMapOvr>
+  <p:timing>
+    <p:tnLst>
+      <p:par>
+        <p:cTn id="1" dur="indefinite" restart="never" nodeType="tmRoot"/>
+      </p:par>
+    </p:tnLst>
+  </p:timing>
+</p:sld>
+</file>
+
+<file path=ppt/slides/slide14.xml><?xml version="1.0" encoding="utf-8"?>
 <p:sld xmlns:a="http://schemas.openxmlformats.org/drawingml/2006/main" xmlns:r="http://schemas.openxmlformats.org/officeDocument/2006/relationships" xmlns:p="http://schemas.openxmlformats.org/presentationml/2006/main">
   <p:cSld>
     <p:spTree>
@@ -6233,7 +6301,7 @@
 </p:sld>
 </file>
 
-<file path=ppt/slides/slide14.xml><?xml version="1.0" encoding="utf-8"?>
+<file path=ppt/slides/slide15.xml><?xml version="1.0" encoding="utf-8"?>
 <p:sld xmlns:a="http://schemas.openxmlformats.org/drawingml/2006/main" xmlns:r="http://schemas.openxmlformats.org/officeDocument/2006/relationships" xmlns:p="http://schemas.openxmlformats.org/presentationml/2006/main">
   <p:cSld>
     <p:spTree>

</xml_diff>